<commit_message>
Just Sample Size & delMode
Created version of model with just sample size and delivery mode
</commit_message>
<xml_diff>
--- a/Poster.pptx
+++ b/Poster.pptx
@@ -5069,7 +5069,7 @@
                 <a:ea typeface="Open Sans" panose="020B0606030504020204" pitchFamily="34" charset="0"/>
                 <a:cs typeface="Times New Roman" panose="02020603050405020304" pitchFamily="18" charset="0"/>
               </a:rPr>
-              <a:t>The produced model not only reconciles bias, but also weighs polls based on methodological processes to create an informed and reproducible  for correcting for pollster bias, systematic or not.</a:t>
+              <a:t>The produced model not only reconciles bias, but also weighs polls based on methodological processes to create an informed and reproducible method for correcting for pollster bias, systematic or not.</a:t>
             </a:r>
           </a:p>
         </p:txBody>
@@ -5620,7 +5620,7 @@
                 <a:latin typeface="Times New Roman" panose="02020603050405020304" pitchFamily="18" charset="0"/>
                 <a:cs typeface="Times New Roman" panose="02020603050405020304" pitchFamily="18" charset="0"/>
               </a:rPr>
-              <a:t>Given the closeness of recent elections, correct and accurate modeling is imperative to understanding and interpreting data from political pollsters, who often report contradictory results based on methodological differences. Even though there are many predictions available, but there is a demand for transparency in the field surrounding the mechanics and algorithms used in election forecasting. </a:t>
+              <a:t>Given the closeness of recent elections, correct and accurate modeling is imperative to understanding and interpreting data from political pollsters, who often report contradictory results based on methodological differences. Even though there are many predictions available, there is still a demand for transparency in the field surrounding the mechanics and algorithms used in election forecasting. </a:t>
             </a:r>
           </a:p>
           <a:p>

</xml_diff>

<commit_message>
Attempt to add bias correction to weighted model
Worked on adding the back the bias correction model into the weighted model.
</commit_message>
<xml_diff>
--- a/Poster.pptx
+++ b/Poster.pptx
@@ -5813,7 +5813,7 @@
       </p:sp>
       <p:pic>
         <p:nvPicPr>
-          <p:cNvPr id="7" name="Picture 6" descr="A screenshot of a social media post&#10;&#10;Description automatically generated">
+          <p:cNvPr id="7" name="Picture 6">
             <a:extLst>
               <a:ext uri="{FF2B5EF4-FFF2-40B4-BE49-F238E27FC236}">
                 <a16:creationId xmlns:a16="http://schemas.microsoft.com/office/drawing/2014/main" id="{5690D18A-FF81-F148-A2A5-B1A97B774299}"/>
@@ -5833,14 +5833,13 @@
               </a:ext>
             </a:extLst>
           </a:blip>
-          <a:stretch>
-            <a:fillRect/>
-          </a:stretch>
+          <a:srcRect/>
+          <a:stretch/>
         </p:blipFill>
         <p:spPr>
           <a:xfrm>
-            <a:off x="22269944" y="13921405"/>
-            <a:ext cx="9787833" cy="6032949"/>
+            <a:off x="21970182" y="13961329"/>
+            <a:ext cx="9787831" cy="6032949"/>
           </a:xfrm>
           <a:prstGeom prst="rect">
             <a:avLst/>
@@ -5849,7 +5848,7 @@
       </p:pic>
       <p:pic>
         <p:nvPicPr>
-          <p:cNvPr id="8" name="Picture 7" descr="A screenshot of a computer&#10;&#10;Description automatically generated">
+          <p:cNvPr id="8" name="Picture 7">
             <a:extLst>
               <a:ext uri="{FF2B5EF4-FFF2-40B4-BE49-F238E27FC236}">
                 <a16:creationId xmlns:a16="http://schemas.microsoft.com/office/drawing/2014/main" id="{84935CD3-AF33-5644-8206-5002A8F5DA53}"/>
@@ -5869,14 +5868,13 @@
               </a:ext>
             </a:extLst>
           </a:blip>
-          <a:stretch>
-            <a:fillRect/>
-          </a:stretch>
+          <a:srcRect/>
+          <a:stretch/>
         </p:blipFill>
         <p:spPr>
           <a:xfrm>
-            <a:off x="12031779" y="13827075"/>
-            <a:ext cx="9787833" cy="6032950"/>
+            <a:off x="12210145" y="13921405"/>
+            <a:ext cx="9787832" cy="6032950"/>
           </a:xfrm>
           <a:prstGeom prst="rect">
             <a:avLst/>

</xml_diff>